<commit_message>
add p300-recording.py file with the fixed training with animals
</commit_message>
<xml_diff>
--- a/images/Count Images/CountTemplate.pptx
+++ b/images/Count Images/CountTemplate.pptx
@@ -6,9 +6,10 @@
   </p:sldMasterIdLst>
   <p:sldIdLst>
     <p:sldId id="256" r:id="rId2"/>
-    <p:sldId id="260" r:id="rId3"/>
-    <p:sldId id="258" r:id="rId4"/>
-    <p:sldId id="261" r:id="rId5"/>
+    <p:sldId id="262" r:id="rId3"/>
+    <p:sldId id="260" r:id="rId4"/>
+    <p:sldId id="258" r:id="rId5"/>
+    <p:sldId id="261" r:id="rId6"/>
   </p:sldIdLst>
   <p:sldSz cx="12192000" cy="6858000"/>
   <p:notesSz cx="6858000" cy="9144000"/>
@@ -115,6 +116,210 @@
 </p:presentation>
 </file>
 
+<file path=ppt/revisionInfo.xml><?xml version="1.0" encoding="utf-8"?>
+<p1510:revInfo xmlns:a="http://schemas.openxmlformats.org/drawingml/2006/main" xmlns:r="http://schemas.openxmlformats.org/officeDocument/2006/relationships" xmlns:p1510="http://schemas.microsoft.com/office/powerpoint/2015/10/main">
+  <p1510:revLst>
+    <p1510:client id="{3E3D49D6-8B5A-A540-860B-D69C5A47DFBE}" v="23" dt="2023-01-02T13:31:12.221"/>
+  </p1510:revLst>
+</p1510:revInfo>
+</file>
+
+<file path=ppt/changesInfos/changesInfo1.xml><?xml version="1.0" encoding="utf-8"?>
+<pc:chgInfo xmlns:a="http://schemas.openxmlformats.org/drawingml/2006/main" xmlns:r="http://schemas.openxmlformats.org/officeDocument/2006/relationships" xmlns:ac="http://schemas.microsoft.com/office/drawing/2013/main/command" xmlns:pc="http://schemas.microsoft.com/office/powerpoint/2013/main/command">
+  <pc:docChgLst>
+    <pc:chgData name="Rinat Saban" userId="43f9d94a-03b3-4ad0-9d58-9eaabf415938" providerId="ADAL" clId="{3E3D49D6-8B5A-A540-860B-D69C5A47DFBE}"/>
+    <pc:docChg chg="undo custSel addSld modSld">
+      <pc:chgData name="Rinat Saban" userId="43f9d94a-03b3-4ad0-9d58-9eaabf415938" providerId="ADAL" clId="{3E3D49D6-8B5A-A540-860B-D69C5A47DFBE}" dt="2023-01-02T13:31:12.221" v="33" actId="20577"/>
+      <pc:docMkLst>
+        <pc:docMk/>
+      </pc:docMkLst>
+      <pc:sldChg chg="addSp delSp modSp mod">
+        <pc:chgData name="Rinat Saban" userId="43f9d94a-03b3-4ad0-9d58-9eaabf415938" providerId="ADAL" clId="{3E3D49D6-8B5A-A540-860B-D69C5A47DFBE}" dt="2023-01-02T13:31:12.221" v="33" actId="20577"/>
+        <pc:sldMkLst>
+          <pc:docMk/>
+          <pc:sldMk cId="424111100" sldId="256"/>
+        </pc:sldMkLst>
+        <pc:spChg chg="mod ord">
+          <ac:chgData name="Rinat Saban" userId="43f9d94a-03b3-4ad0-9d58-9eaabf415938" providerId="ADAL" clId="{3E3D49D6-8B5A-A540-860B-D69C5A47DFBE}" dt="2023-01-02T13:31:12.221" v="33" actId="20577"/>
+          <ac:spMkLst>
+            <pc:docMk/>
+            <pc:sldMk cId="424111100" sldId="256"/>
+            <ac:spMk id="2" creationId="{A9907FD6-C09F-DA96-4102-0D5614064BE5}"/>
+          </ac:spMkLst>
+        </pc:spChg>
+        <pc:spChg chg="add del">
+          <ac:chgData name="Rinat Saban" userId="43f9d94a-03b3-4ad0-9d58-9eaabf415938" providerId="ADAL" clId="{3E3D49D6-8B5A-A540-860B-D69C5A47DFBE}" dt="2023-01-02T13:29:58.504" v="11" actId="26606"/>
+          <ac:spMkLst>
+            <pc:docMk/>
+            <pc:sldMk cId="424111100" sldId="256"/>
+            <ac:spMk id="8" creationId="{9B7AD9F6-8CE7-4299-8FC6-328F4DCD3FF9}"/>
+          </ac:spMkLst>
+        </pc:spChg>
+        <pc:spChg chg="add del">
+          <ac:chgData name="Rinat Saban" userId="43f9d94a-03b3-4ad0-9d58-9eaabf415938" providerId="ADAL" clId="{3E3D49D6-8B5A-A540-860B-D69C5A47DFBE}" dt="2023-01-02T13:29:58.504" v="11" actId="26606"/>
+          <ac:spMkLst>
+            <pc:docMk/>
+            <pc:sldMk cId="424111100" sldId="256"/>
+            <ac:spMk id="10" creationId="{F49775AF-8896-43EE-92C6-83497D6DC56F}"/>
+          </ac:spMkLst>
+        </pc:spChg>
+        <pc:spChg chg="add del">
+          <ac:chgData name="Rinat Saban" userId="43f9d94a-03b3-4ad0-9d58-9eaabf415938" providerId="ADAL" clId="{3E3D49D6-8B5A-A540-860B-D69C5A47DFBE}" dt="2023-01-02T13:29:56.886" v="8" actId="26606"/>
+          <ac:spMkLst>
+            <pc:docMk/>
+            <pc:sldMk cId="424111100" sldId="256"/>
+            <ac:spMk id="15" creationId="{9B7AD9F6-8CE7-4299-8FC6-328F4DCD3FF9}"/>
+          </ac:spMkLst>
+        </pc:spChg>
+        <pc:spChg chg="add del">
+          <ac:chgData name="Rinat Saban" userId="43f9d94a-03b3-4ad0-9d58-9eaabf415938" providerId="ADAL" clId="{3E3D49D6-8B5A-A540-860B-D69C5A47DFBE}" dt="2023-01-02T13:29:56.886" v="8" actId="26606"/>
+          <ac:spMkLst>
+            <pc:docMk/>
+            <pc:sldMk cId="424111100" sldId="256"/>
+            <ac:spMk id="17" creationId="{F49775AF-8896-43EE-92C6-83497D6DC56F}"/>
+          </ac:spMkLst>
+        </pc:spChg>
+        <pc:spChg chg="add del">
+          <ac:chgData name="Rinat Saban" userId="43f9d94a-03b3-4ad0-9d58-9eaabf415938" providerId="ADAL" clId="{3E3D49D6-8B5A-A540-860B-D69C5A47DFBE}" dt="2023-01-02T13:29:58.498" v="10" actId="26606"/>
+          <ac:spMkLst>
+            <pc:docMk/>
+            <pc:sldMk cId="424111100" sldId="256"/>
+            <ac:spMk id="19" creationId="{9F6380B4-6A1C-481E-8408-B4E6C75B9B81}"/>
+          </ac:spMkLst>
+        </pc:spChg>
+        <pc:spChg chg="add del">
+          <ac:chgData name="Rinat Saban" userId="43f9d94a-03b3-4ad0-9d58-9eaabf415938" providerId="ADAL" clId="{3E3D49D6-8B5A-A540-860B-D69C5A47DFBE}" dt="2023-01-02T13:29:58.498" v="10" actId="26606"/>
+          <ac:spMkLst>
+            <pc:docMk/>
+            <pc:sldMk cId="424111100" sldId="256"/>
+            <ac:spMk id="20" creationId="{657F69E0-C4B0-4BEC-A689-4F8D877F05D4}"/>
+          </ac:spMkLst>
+        </pc:spChg>
+        <pc:spChg chg="add del">
+          <ac:chgData name="Rinat Saban" userId="43f9d94a-03b3-4ad0-9d58-9eaabf415938" providerId="ADAL" clId="{3E3D49D6-8B5A-A540-860B-D69C5A47DFBE}" dt="2023-01-02T13:29:58.498" v="10" actId="26606"/>
+          <ac:spMkLst>
+            <pc:docMk/>
+            <pc:sldMk cId="424111100" sldId="256"/>
+            <ac:spMk id="21" creationId="{8F51725E-A483-43B2-A6F2-C44F502FE033}"/>
+          </ac:spMkLst>
+        </pc:spChg>
+        <pc:spChg chg="add">
+          <ac:chgData name="Rinat Saban" userId="43f9d94a-03b3-4ad0-9d58-9eaabf415938" providerId="ADAL" clId="{3E3D49D6-8B5A-A540-860B-D69C5A47DFBE}" dt="2023-01-02T13:29:58.504" v="11" actId="26606"/>
+          <ac:spMkLst>
+            <pc:docMk/>
+            <pc:sldMk cId="424111100" sldId="256"/>
+            <ac:spMk id="23" creationId="{9B7AD9F6-8CE7-4299-8FC6-328F4DCD3FF9}"/>
+          </ac:spMkLst>
+        </pc:spChg>
+        <pc:spChg chg="add">
+          <ac:chgData name="Rinat Saban" userId="43f9d94a-03b3-4ad0-9d58-9eaabf415938" providerId="ADAL" clId="{3E3D49D6-8B5A-A540-860B-D69C5A47DFBE}" dt="2023-01-02T13:29:58.504" v="11" actId="26606"/>
+          <ac:spMkLst>
+            <pc:docMk/>
+            <pc:sldMk cId="424111100" sldId="256"/>
+            <ac:spMk id="24" creationId="{F49775AF-8896-43EE-92C6-83497D6DC56F}"/>
+          </ac:spMkLst>
+        </pc:spChg>
+        <pc:picChg chg="mod">
+          <ac:chgData name="Rinat Saban" userId="43f9d94a-03b3-4ad0-9d58-9eaabf415938" providerId="ADAL" clId="{3E3D49D6-8B5A-A540-860B-D69C5A47DFBE}" dt="2023-01-02T13:29:58.498" v="10" actId="26606"/>
+          <ac:picMkLst>
+            <pc:docMk/>
+            <pc:sldMk cId="424111100" sldId="256"/>
+            <ac:picMk id="4" creationId="{AB04214F-A53F-AF8A-5DC6-8E0909337821}"/>
+          </ac:picMkLst>
+        </pc:picChg>
+      </pc:sldChg>
+      <pc:sldChg chg="addSp delSp modSp new mod setBg modAnim setClrOvrMap delDesignElem">
+        <pc:chgData name="Rinat Saban" userId="43f9d94a-03b3-4ad0-9d58-9eaabf415938" providerId="ADAL" clId="{3E3D49D6-8B5A-A540-860B-D69C5A47DFBE}" dt="2023-01-02T13:31:03.964" v="21" actId="20577"/>
+        <pc:sldMkLst>
+          <pc:docMk/>
+          <pc:sldMk cId="2587250413" sldId="262"/>
+        </pc:sldMkLst>
+        <pc:spChg chg="del">
+          <ac:chgData name="Rinat Saban" userId="43f9d94a-03b3-4ad0-9d58-9eaabf415938" providerId="ADAL" clId="{3E3D49D6-8B5A-A540-860B-D69C5A47DFBE}" dt="2023-01-02T13:30:37.239" v="14" actId="478"/>
+          <ac:spMkLst>
+            <pc:docMk/>
+            <pc:sldMk cId="2587250413" sldId="262"/>
+            <ac:spMk id="2" creationId="{B603A84A-0677-256A-36F0-8522D434C616}"/>
+          </ac:spMkLst>
+        </pc:spChg>
+        <pc:spChg chg="del">
+          <ac:chgData name="Rinat Saban" userId="43f9d94a-03b3-4ad0-9d58-9eaabf415938" providerId="ADAL" clId="{3E3D49D6-8B5A-A540-860B-D69C5A47DFBE}" dt="2023-01-02T13:30:38.732" v="15" actId="478"/>
+          <ac:spMkLst>
+            <pc:docMk/>
+            <pc:sldMk cId="2587250413" sldId="262"/>
+            <ac:spMk id="3" creationId="{CF84C621-AA10-B8F6-73F0-AC8E25CC0764}"/>
+          </ac:spMkLst>
+        </pc:spChg>
+        <pc:spChg chg="add mod">
+          <ac:chgData name="Rinat Saban" userId="43f9d94a-03b3-4ad0-9d58-9eaabf415938" providerId="ADAL" clId="{3E3D49D6-8B5A-A540-860B-D69C5A47DFBE}" dt="2023-01-02T13:31:03.964" v="21" actId="20577"/>
+          <ac:spMkLst>
+            <pc:docMk/>
+            <pc:sldMk cId="2587250413" sldId="262"/>
+            <ac:spMk id="4" creationId="{F8FAD16B-1C6E-1FC8-4D27-32E2AC90B369}"/>
+          </ac:spMkLst>
+        </pc:spChg>
+        <pc:spChg chg="add del">
+          <ac:chgData name="Rinat Saban" userId="43f9d94a-03b3-4ad0-9d58-9eaabf415938" providerId="ADAL" clId="{3E3D49D6-8B5A-A540-860B-D69C5A47DFBE}" dt="2023-01-02T13:30:52.635" v="18"/>
+          <ac:spMkLst>
+            <pc:docMk/>
+            <pc:sldMk cId="2587250413" sldId="262"/>
+            <ac:spMk id="10" creationId="{DA381740-063A-41A4-836D-85D14980EEF0}"/>
+          </ac:spMkLst>
+        </pc:spChg>
+        <pc:spChg chg="add">
+          <ac:chgData name="Rinat Saban" userId="43f9d94a-03b3-4ad0-9d58-9eaabf415938" providerId="ADAL" clId="{3E3D49D6-8B5A-A540-860B-D69C5A47DFBE}" dt="2023-01-02T13:30:58.169" v="19" actId="26606"/>
+          <ac:spMkLst>
+            <pc:docMk/>
+            <pc:sldMk cId="2587250413" sldId="262"/>
+            <ac:spMk id="11" creationId="{DA381740-063A-41A4-836D-85D14980EEF0}"/>
+          </ac:spMkLst>
+        </pc:spChg>
+        <pc:spChg chg="add del">
+          <ac:chgData name="Rinat Saban" userId="43f9d94a-03b3-4ad0-9d58-9eaabf415938" providerId="ADAL" clId="{3E3D49D6-8B5A-A540-860B-D69C5A47DFBE}" dt="2023-01-02T13:30:52.635" v="18"/>
+          <ac:spMkLst>
+            <pc:docMk/>
+            <pc:sldMk cId="2587250413" sldId="262"/>
+            <ac:spMk id="12" creationId="{9B7AD9F6-8CE7-4299-8FC6-328F4DCD3FF9}"/>
+          </ac:spMkLst>
+        </pc:spChg>
+        <pc:spChg chg="add">
+          <ac:chgData name="Rinat Saban" userId="43f9d94a-03b3-4ad0-9d58-9eaabf415938" providerId="ADAL" clId="{3E3D49D6-8B5A-A540-860B-D69C5A47DFBE}" dt="2023-01-02T13:30:58.169" v="19" actId="26606"/>
+          <ac:spMkLst>
+            <pc:docMk/>
+            <pc:sldMk cId="2587250413" sldId="262"/>
+            <ac:spMk id="13" creationId="{9B7AD9F6-8CE7-4299-8FC6-328F4DCD3FF9}"/>
+          </ac:spMkLst>
+        </pc:spChg>
+        <pc:spChg chg="add del">
+          <ac:chgData name="Rinat Saban" userId="43f9d94a-03b3-4ad0-9d58-9eaabf415938" providerId="ADAL" clId="{3E3D49D6-8B5A-A540-860B-D69C5A47DFBE}" dt="2023-01-02T13:30:52.635" v="18"/>
+          <ac:spMkLst>
+            <pc:docMk/>
+            <pc:sldMk cId="2587250413" sldId="262"/>
+            <ac:spMk id="14" creationId="{F49775AF-8896-43EE-92C6-83497D6DC56F}"/>
+          </ac:spMkLst>
+        </pc:spChg>
+        <pc:spChg chg="add">
+          <ac:chgData name="Rinat Saban" userId="43f9d94a-03b3-4ad0-9d58-9eaabf415938" providerId="ADAL" clId="{3E3D49D6-8B5A-A540-860B-D69C5A47DFBE}" dt="2023-01-02T13:30:58.169" v="19" actId="26606"/>
+          <ac:spMkLst>
+            <pc:docMk/>
+            <pc:sldMk cId="2587250413" sldId="262"/>
+            <ac:spMk id="15" creationId="{F49775AF-8896-43EE-92C6-83497D6DC56F}"/>
+          </ac:spMkLst>
+        </pc:spChg>
+        <pc:picChg chg="add mod">
+          <ac:chgData name="Rinat Saban" userId="43f9d94a-03b3-4ad0-9d58-9eaabf415938" providerId="ADAL" clId="{3E3D49D6-8B5A-A540-860B-D69C5A47DFBE}" dt="2023-01-02T13:30:58.169" v="19" actId="26606"/>
+          <ac:picMkLst>
+            <pc:docMk/>
+            <pc:sldMk cId="2587250413" sldId="262"/>
+            <ac:picMk id="6" creationId="{185BD5F3-921A-853D-C4AD-3770E567926B}"/>
+          </ac:picMkLst>
+        </pc:picChg>
+      </pc:sldChg>
+    </pc:docChg>
+  </pc:docChgLst>
+</pc:chgInfo>
+</file>
+
 <file path=ppt/slideLayouts/slideLayout1.xml><?xml version="1.0" encoding="utf-8"?>
 <p:sldLayout xmlns:a="http://schemas.openxmlformats.org/drawingml/2006/main" xmlns:r="http://schemas.openxmlformats.org/officeDocument/2006/relationships" xmlns:p="http://schemas.openxmlformats.org/presentationml/2006/main" type="title" preserve="1">
   <p:cSld name="Title Slide">
@@ -603,7 +808,7 @@
           <a:p>
             <a:fld id="{72345051-2045-45DA-935E-2E3CA1A69ADC}" type="datetimeFigureOut">
               <a:rPr lang="en-US" smtClean="0"/>
-              <a:t>1/2/2023</a:t>
+              <a:t>1/2/23</a:t>
             </a:fld>
             <a:endParaRPr lang="en-US" dirty="0"/>
           </a:p>
@@ -801,7 +1006,7 @@
           <a:p>
             <a:fld id="{72345051-2045-45DA-935E-2E3CA1A69ADC}" type="datetimeFigureOut">
               <a:rPr lang="en-US" smtClean="0"/>
-              <a:t>1/2/2023</a:t>
+              <a:t>1/2/23</a:t>
             </a:fld>
             <a:endParaRPr lang="en-US"/>
           </a:p>
@@ -1009,7 +1214,7 @@
           <a:p>
             <a:fld id="{72345051-2045-45DA-935E-2E3CA1A69ADC}" type="datetimeFigureOut">
               <a:rPr lang="en-US" smtClean="0"/>
-              <a:t>1/2/2023</a:t>
+              <a:t>1/2/23</a:t>
             </a:fld>
             <a:endParaRPr lang="en-US"/>
           </a:p>
@@ -1231,7 +1436,7 @@
           <a:p>
             <a:fld id="{72345051-2045-45DA-935E-2E3CA1A69ADC}" type="datetimeFigureOut">
               <a:rPr lang="en-US" smtClean="0"/>
-              <a:t>1/2/2023</a:t>
+              <a:t>1/2/23</a:t>
             </a:fld>
             <a:endParaRPr lang="en-US"/>
           </a:p>
@@ -2142,7 +2347,7 @@
           <a:p>
             <a:fld id="{72345051-2045-45DA-935E-2E3CA1A69ADC}" type="datetimeFigureOut">
               <a:rPr lang="en-US" smtClean="0"/>
-              <a:t>1/2/2023</a:t>
+              <a:t>1/2/23</a:t>
             </a:fld>
             <a:endParaRPr lang="en-US"/>
           </a:p>
@@ -2745,7 +2950,7 @@
           <a:p>
             <a:fld id="{72345051-2045-45DA-935E-2E3CA1A69ADC}" type="datetimeFigureOut">
               <a:rPr lang="en-US" smtClean="0"/>
-              <a:t>1/2/2023</a:t>
+              <a:t>1/2/23</a:t>
             </a:fld>
             <a:endParaRPr lang="en-US"/>
           </a:p>
@@ -3793,7 +3998,7 @@
           <a:p>
             <a:fld id="{72345051-2045-45DA-935E-2E3CA1A69ADC}" type="datetimeFigureOut">
               <a:rPr lang="en-US" smtClean="0"/>
-              <a:t>1/2/2023</a:t>
+              <a:t>1/2/23</a:t>
             </a:fld>
             <a:endParaRPr lang="en-US"/>
           </a:p>
@@ -4577,7 +4782,7 @@
           <a:p>
             <a:fld id="{72345051-2045-45DA-935E-2E3CA1A69ADC}" type="datetimeFigureOut">
               <a:rPr lang="en-US" smtClean="0"/>
-              <a:t>1/2/2023</a:t>
+              <a:t>1/2/23</a:t>
             </a:fld>
             <a:endParaRPr lang="en-US"/>
           </a:p>
@@ -5026,7 +5231,7 @@
           <a:p>
             <a:fld id="{72345051-2045-45DA-935E-2E3CA1A69ADC}" type="datetimeFigureOut">
               <a:rPr lang="en-US" smtClean="0"/>
-              <a:t>1/2/2023</a:t>
+              <a:t>1/2/23</a:t>
             </a:fld>
             <a:endParaRPr lang="en-US"/>
           </a:p>
@@ -5343,7 +5548,7 @@
           <a:p>
             <a:fld id="{72345051-2045-45DA-935E-2E3CA1A69ADC}" type="datetimeFigureOut">
               <a:rPr lang="en-US" smtClean="0"/>
-              <a:t>1/2/2023</a:t>
+              <a:t>1/2/23</a:t>
             </a:fld>
             <a:endParaRPr lang="en-US"/>
           </a:p>
@@ -5971,7 +6176,7 @@
           <a:p>
             <a:fld id="{72345051-2045-45DA-935E-2E3CA1A69ADC}" type="datetimeFigureOut">
               <a:rPr lang="en-US" smtClean="0"/>
-              <a:t>1/2/2023</a:t>
+              <a:t>1/2/23</a:t>
             </a:fld>
             <a:endParaRPr lang="en-US"/>
           </a:p>
@@ -6544,7 +6749,7 @@
           <a:p>
             <a:fld id="{72345051-2045-45DA-935E-2E3CA1A69ADC}" type="datetimeFigureOut">
               <a:rPr lang="en-US" smtClean="0"/>
-              <a:t>1/2/2023</a:t>
+              <a:t>1/2/23</a:t>
             </a:fld>
             <a:endParaRPr lang="en-US" dirty="0"/>
           </a:p>
@@ -6971,7 +7176,7 @@
       </p:grpSpPr>
       <p:sp useBgFill="1">
         <p:nvSpPr>
-          <p:cNvPr id="8" name="Rectangle 7">
+          <p:cNvPr id="23" name="Rectangle 14">
             <a:extLst>
               <a:ext uri="{FF2B5EF4-FFF2-40B4-BE49-F238E27FC236}">
                 <a16:creationId xmlns:a16="http://schemas.microsoft.com/office/drawing/2014/main" id="{9B7AD9F6-8CE7-4299-8FC6-328F4DCD3FF9}"/>
@@ -7057,7 +7262,6 @@
           </a:bodyPr>
           <a:lstStyle/>
           <a:p>
-            <a:pPr algn="ctr"/>
             <a:r>
               <a:rPr lang="he-IL" b="1" i="1" dirty="0"/>
               <a:t>כמה חתולים מופיעים?</a:t>
@@ -7068,7 +7272,7 @@
       </p:sp>
       <p:sp>
         <p:nvSpPr>
-          <p:cNvPr id="10" name="Rectangle 6">
+          <p:cNvPr id="24" name="Rectangle 6">
             <a:extLst>
               <a:ext uri="{FF2B5EF4-FFF2-40B4-BE49-F238E27FC236}">
                 <a16:creationId xmlns:a16="http://schemas.microsoft.com/office/drawing/2014/main" id="{F49775AF-8896-43EE-92C6-83497D6DC56F}"/>
@@ -7680,6 +7884,1107 @@
           <a:chExt cx="0" cy="0"/>
         </a:xfrm>
       </p:grpSpPr>
+      <p:sp>
+        <p:nvSpPr>
+          <p:cNvPr id="11" name="Rectangle 6">
+            <a:extLst>
+              <a:ext uri="{FF2B5EF4-FFF2-40B4-BE49-F238E27FC236}">
+                <a16:creationId xmlns:a16="http://schemas.microsoft.com/office/drawing/2014/main" id="{DA381740-063A-41A4-836D-85D14980EEF0}"/>
+              </a:ext>
+              <a:ext uri="{C183D7F6-B498-43B3-948B-1728B52AA6E4}">
+                <adec:decorative xmlns:adec="http://schemas.microsoft.com/office/drawing/2017/decorative" val="1"/>
+              </a:ext>
+            </a:extLst>
+          </p:cNvPr>
+          <p:cNvSpPr>
+            <a:spLocks noGrp="1" noRot="1" noChangeAspect="1" noMove="1" noResize="1" noEditPoints="1" noAdjustHandles="1" noChangeArrowheads="1" noChangeShapeType="1" noTextEdit="1"/>
+          </p:cNvSpPr>
+          <p:nvPr>
+            <p:extLst>
+              <p:ext uri="{386F3935-93C4-4BCD-93E2-E3B085C9AB24}">
+                <p16:designElem xmlns:p16="http://schemas.microsoft.com/office/powerpoint/2015/main" val="1"/>
+              </p:ext>
+            </p:extLst>
+          </p:nvPr>
+        </p:nvSpPr>
+        <p:spPr>
+          <a:xfrm>
+            <a:off x="838200" y="4736883"/>
+            <a:ext cx="4243589" cy="27432"/>
+          </a:xfrm>
+          <a:custGeom>
+            <a:avLst/>
+            <a:gdLst>
+              <a:gd name="connsiteX0" fmla="*/ 0 w 4243589"/>
+              <a:gd name="connsiteY0" fmla="*/ 0 h 27432"/>
+              <a:gd name="connsiteX1" fmla="*/ 563791 w 4243589"/>
+              <a:gd name="connsiteY1" fmla="*/ 0 h 27432"/>
+              <a:gd name="connsiteX2" fmla="*/ 1042710 w 4243589"/>
+              <a:gd name="connsiteY2" fmla="*/ 0 h 27432"/>
+              <a:gd name="connsiteX3" fmla="*/ 1564066 w 4243589"/>
+              <a:gd name="connsiteY3" fmla="*/ 0 h 27432"/>
+              <a:gd name="connsiteX4" fmla="*/ 2212729 w 4243589"/>
+              <a:gd name="connsiteY4" fmla="*/ 0 h 27432"/>
+              <a:gd name="connsiteX5" fmla="*/ 2776520 w 4243589"/>
+              <a:gd name="connsiteY5" fmla="*/ 0 h 27432"/>
+              <a:gd name="connsiteX6" fmla="*/ 3297875 w 4243589"/>
+              <a:gd name="connsiteY6" fmla="*/ 0 h 27432"/>
+              <a:gd name="connsiteX7" fmla="*/ 4243589 w 4243589"/>
+              <a:gd name="connsiteY7" fmla="*/ 0 h 27432"/>
+              <a:gd name="connsiteX8" fmla="*/ 4243589 w 4243589"/>
+              <a:gd name="connsiteY8" fmla="*/ 27432 h 27432"/>
+              <a:gd name="connsiteX9" fmla="*/ 3637362 w 4243589"/>
+              <a:gd name="connsiteY9" fmla="*/ 27432 h 27432"/>
+              <a:gd name="connsiteX10" fmla="*/ 3116007 w 4243589"/>
+              <a:gd name="connsiteY10" fmla="*/ 27432 h 27432"/>
+              <a:gd name="connsiteX11" fmla="*/ 2424908 w 4243589"/>
+              <a:gd name="connsiteY11" fmla="*/ 27432 h 27432"/>
+              <a:gd name="connsiteX12" fmla="*/ 1861117 w 4243589"/>
+              <a:gd name="connsiteY12" fmla="*/ 27432 h 27432"/>
+              <a:gd name="connsiteX13" fmla="*/ 1382198 w 4243589"/>
+              <a:gd name="connsiteY13" fmla="*/ 27432 h 27432"/>
+              <a:gd name="connsiteX14" fmla="*/ 733535 w 4243589"/>
+              <a:gd name="connsiteY14" fmla="*/ 27432 h 27432"/>
+              <a:gd name="connsiteX15" fmla="*/ 0 w 4243589"/>
+              <a:gd name="connsiteY15" fmla="*/ 27432 h 27432"/>
+              <a:gd name="connsiteX16" fmla="*/ 0 w 4243589"/>
+              <a:gd name="connsiteY16" fmla="*/ 0 h 27432"/>
+            </a:gdLst>
+            <a:ahLst/>
+            <a:cxnLst>
+              <a:cxn ang="0">
+                <a:pos x="connsiteX0" y="connsiteY0"/>
+              </a:cxn>
+              <a:cxn ang="0">
+                <a:pos x="connsiteX1" y="connsiteY1"/>
+              </a:cxn>
+              <a:cxn ang="0">
+                <a:pos x="connsiteX2" y="connsiteY2"/>
+              </a:cxn>
+              <a:cxn ang="0">
+                <a:pos x="connsiteX3" y="connsiteY3"/>
+              </a:cxn>
+              <a:cxn ang="0">
+                <a:pos x="connsiteX4" y="connsiteY4"/>
+              </a:cxn>
+              <a:cxn ang="0">
+                <a:pos x="connsiteX5" y="connsiteY5"/>
+              </a:cxn>
+              <a:cxn ang="0">
+                <a:pos x="connsiteX6" y="connsiteY6"/>
+              </a:cxn>
+              <a:cxn ang="0">
+                <a:pos x="connsiteX7" y="connsiteY7"/>
+              </a:cxn>
+              <a:cxn ang="0">
+                <a:pos x="connsiteX8" y="connsiteY8"/>
+              </a:cxn>
+              <a:cxn ang="0">
+                <a:pos x="connsiteX9" y="connsiteY9"/>
+              </a:cxn>
+              <a:cxn ang="0">
+                <a:pos x="connsiteX10" y="connsiteY10"/>
+              </a:cxn>
+              <a:cxn ang="0">
+                <a:pos x="connsiteX11" y="connsiteY11"/>
+              </a:cxn>
+              <a:cxn ang="0">
+                <a:pos x="connsiteX12" y="connsiteY12"/>
+              </a:cxn>
+              <a:cxn ang="0">
+                <a:pos x="connsiteX13" y="connsiteY13"/>
+              </a:cxn>
+              <a:cxn ang="0">
+                <a:pos x="connsiteX14" y="connsiteY14"/>
+              </a:cxn>
+              <a:cxn ang="0">
+                <a:pos x="connsiteX15" y="connsiteY15"/>
+              </a:cxn>
+              <a:cxn ang="0">
+                <a:pos x="connsiteX16" y="connsiteY16"/>
+              </a:cxn>
+            </a:cxnLst>
+            <a:rect l="l" t="t" r="r" b="b"/>
+            <a:pathLst>
+              <a:path w="4243589" h="27432" fill="none" extrusionOk="0">
+                <a:moveTo>
+                  <a:pt x="0" y="0"/>
+                </a:moveTo>
+                <a:cubicBezTo>
+                  <a:pt x="157351" y="-15653"/>
+                  <a:pt x="378877" y="-5828"/>
+                  <a:pt x="563791" y="0"/>
+                </a:cubicBezTo>
+                <a:cubicBezTo>
+                  <a:pt x="748705" y="5828"/>
+                  <a:pt x="905659" y="-5525"/>
+                  <a:pt x="1042710" y="0"/>
+                </a:cubicBezTo>
+                <a:cubicBezTo>
+                  <a:pt x="1179761" y="5525"/>
+                  <a:pt x="1356845" y="-21288"/>
+                  <a:pt x="1564066" y="0"/>
+                </a:cubicBezTo>
+                <a:cubicBezTo>
+                  <a:pt x="1771287" y="21288"/>
+                  <a:pt x="1912099" y="25135"/>
+                  <a:pt x="2212729" y="0"/>
+                </a:cubicBezTo>
+                <a:cubicBezTo>
+                  <a:pt x="2513359" y="-25135"/>
+                  <a:pt x="2514918" y="-27119"/>
+                  <a:pt x="2776520" y="0"/>
+                </a:cubicBezTo>
+                <a:cubicBezTo>
+                  <a:pt x="3038122" y="27119"/>
+                  <a:pt x="3178771" y="18116"/>
+                  <a:pt x="3297875" y="0"/>
+                </a:cubicBezTo>
+                <a:cubicBezTo>
+                  <a:pt x="3416980" y="-18116"/>
+                  <a:pt x="4012240" y="-40869"/>
+                  <a:pt x="4243589" y="0"/>
+                </a:cubicBezTo>
+                <a:cubicBezTo>
+                  <a:pt x="4242616" y="8304"/>
+                  <a:pt x="4243111" y="21512"/>
+                  <a:pt x="4243589" y="27432"/>
+                </a:cubicBezTo>
+                <a:cubicBezTo>
+                  <a:pt x="4112949" y="6289"/>
+                  <a:pt x="3928037" y="10975"/>
+                  <a:pt x="3637362" y="27432"/>
+                </a:cubicBezTo>
+                <a:cubicBezTo>
+                  <a:pt x="3346687" y="43889"/>
+                  <a:pt x="3254446" y="35813"/>
+                  <a:pt x="3116007" y="27432"/>
+                </a:cubicBezTo>
+                <a:cubicBezTo>
+                  <a:pt x="2977569" y="19051"/>
+                  <a:pt x="2620228" y="38017"/>
+                  <a:pt x="2424908" y="27432"/>
+                </a:cubicBezTo>
+                <a:cubicBezTo>
+                  <a:pt x="2229588" y="16847"/>
+                  <a:pt x="2088287" y="5290"/>
+                  <a:pt x="1861117" y="27432"/>
+                </a:cubicBezTo>
+                <a:cubicBezTo>
+                  <a:pt x="1633947" y="49574"/>
+                  <a:pt x="1502447" y="8273"/>
+                  <a:pt x="1382198" y="27432"/>
+                </a:cubicBezTo>
+                <a:cubicBezTo>
+                  <a:pt x="1261949" y="46591"/>
+                  <a:pt x="1045440" y="37497"/>
+                  <a:pt x="733535" y="27432"/>
+                </a:cubicBezTo>
+                <a:cubicBezTo>
+                  <a:pt x="421630" y="17367"/>
+                  <a:pt x="341257" y="-9215"/>
+                  <a:pt x="0" y="27432"/>
+                </a:cubicBezTo>
+                <a:cubicBezTo>
+                  <a:pt x="-1048" y="14992"/>
+                  <a:pt x="-1120" y="7447"/>
+                  <a:pt x="0" y="0"/>
+                </a:cubicBezTo>
+                <a:close/>
+              </a:path>
+              <a:path w="4243589" h="27432" stroke="0" extrusionOk="0">
+                <a:moveTo>
+                  <a:pt x="0" y="0"/>
+                </a:moveTo>
+                <a:cubicBezTo>
+                  <a:pt x="128164" y="17204"/>
+                  <a:pt x="312653" y="1129"/>
+                  <a:pt x="563791" y="0"/>
+                </a:cubicBezTo>
+                <a:cubicBezTo>
+                  <a:pt x="814929" y="-1129"/>
+                  <a:pt x="837271" y="8503"/>
+                  <a:pt x="1042710" y="0"/>
+                </a:cubicBezTo>
+                <a:cubicBezTo>
+                  <a:pt x="1248149" y="-8503"/>
+                  <a:pt x="1588432" y="-28862"/>
+                  <a:pt x="1733809" y="0"/>
+                </a:cubicBezTo>
+                <a:cubicBezTo>
+                  <a:pt x="1879186" y="28862"/>
+                  <a:pt x="2052815" y="5974"/>
+                  <a:pt x="2297600" y="0"/>
+                </a:cubicBezTo>
+                <a:cubicBezTo>
+                  <a:pt x="2542385" y="-5974"/>
+                  <a:pt x="2699960" y="-23550"/>
+                  <a:pt x="2861391" y="0"/>
+                </a:cubicBezTo>
+                <a:cubicBezTo>
+                  <a:pt x="3022822" y="23550"/>
+                  <a:pt x="3390411" y="25272"/>
+                  <a:pt x="3552490" y="0"/>
+                </a:cubicBezTo>
+                <a:cubicBezTo>
+                  <a:pt x="3714569" y="-25272"/>
+                  <a:pt x="3950585" y="-31327"/>
+                  <a:pt x="4243589" y="0"/>
+                </a:cubicBezTo>
+                <a:cubicBezTo>
+                  <a:pt x="4244074" y="9333"/>
+                  <a:pt x="4244867" y="19699"/>
+                  <a:pt x="4243589" y="27432"/>
+                </a:cubicBezTo>
+                <a:cubicBezTo>
+                  <a:pt x="4130424" y="7904"/>
+                  <a:pt x="3932803" y="51393"/>
+                  <a:pt x="3722234" y="27432"/>
+                </a:cubicBezTo>
+                <a:cubicBezTo>
+                  <a:pt x="3511665" y="3471"/>
+                  <a:pt x="3269903" y="55138"/>
+                  <a:pt x="3116007" y="27432"/>
+                </a:cubicBezTo>
+                <a:cubicBezTo>
+                  <a:pt x="2962111" y="-274"/>
+                  <a:pt x="2744280" y="32368"/>
+                  <a:pt x="2509780" y="27432"/>
+                </a:cubicBezTo>
+                <a:cubicBezTo>
+                  <a:pt x="2275280" y="22496"/>
+                  <a:pt x="2066059" y="52808"/>
+                  <a:pt x="1945989" y="27432"/>
+                </a:cubicBezTo>
+                <a:cubicBezTo>
+                  <a:pt x="1825919" y="2056"/>
+                  <a:pt x="1407329" y="21760"/>
+                  <a:pt x="1254890" y="27432"/>
+                </a:cubicBezTo>
+                <a:cubicBezTo>
+                  <a:pt x="1102451" y="33104"/>
+                  <a:pt x="837950" y="40817"/>
+                  <a:pt x="563791" y="27432"/>
+                </a:cubicBezTo>
+                <a:cubicBezTo>
+                  <a:pt x="289632" y="14047"/>
+                  <a:pt x="132768" y="16249"/>
+                  <a:pt x="0" y="27432"/>
+                </a:cubicBezTo>
+                <a:cubicBezTo>
+                  <a:pt x="211" y="18145"/>
+                  <a:pt x="120" y="6480"/>
+                  <a:pt x="0" y="0"/>
+                </a:cubicBezTo>
+                <a:close/>
+              </a:path>
+            </a:pathLst>
+          </a:custGeom>
+          <a:solidFill>
+            <a:schemeClr val="tx1"/>
+          </a:solidFill>
+          <a:ln w="38100" cap="rnd">
+            <a:solidFill>
+              <a:schemeClr val="tx1"/>
+            </a:solidFill>
+            <a:round/>
+            <a:extLst>
+              <a:ext uri="{C807C97D-BFC1-408E-A445-0C87EB9F89A2}">
+                <ask:lineSketchStyleProps xmlns:ask="http://schemas.microsoft.com/office/drawing/2018/sketchyshapes" sd="1219033472">
+                  <a:prstGeom prst="rect">
+                    <a:avLst/>
+                  </a:prstGeom>
+                  <ask:type>
+                    <ask:lineSketchFreehand/>
+                  </ask:type>
+                </ask:lineSketchStyleProps>
+              </a:ext>
+            </a:extLst>
+          </a:ln>
+        </p:spPr>
+        <p:style>
+          <a:lnRef idx="2">
+            <a:schemeClr val="accent1">
+              <a:shade val="50000"/>
+            </a:schemeClr>
+          </a:lnRef>
+          <a:fillRef idx="1">
+            <a:schemeClr val="accent1"/>
+          </a:fillRef>
+          <a:effectRef idx="0">
+            <a:schemeClr val="accent1"/>
+          </a:effectRef>
+          <a:fontRef idx="minor">
+            <a:schemeClr val="lt1"/>
+          </a:fontRef>
+        </p:style>
+        <p:txBody>
+          <a:bodyPr rtlCol="0" anchor="ctr"/>
+          <a:lstStyle/>
+          <a:p>
+            <a:pPr algn="ctr"/>
+            <a:endParaRPr lang="en-US">
+              <a:solidFill>
+                <a:schemeClr val="tx1"/>
+              </a:solidFill>
+            </a:endParaRPr>
+          </a:p>
+        </p:txBody>
+      </p:sp>
+      <p:sp useBgFill="1">
+        <p:nvSpPr>
+          <p:cNvPr id="13" name="Rectangle 12">
+            <a:extLst>
+              <a:ext uri="{FF2B5EF4-FFF2-40B4-BE49-F238E27FC236}">
+                <a16:creationId xmlns:a16="http://schemas.microsoft.com/office/drawing/2014/main" id="{9B7AD9F6-8CE7-4299-8FC6-328F4DCD3FF9}"/>
+              </a:ext>
+              <a:ext uri="{C183D7F6-B498-43B3-948B-1728B52AA6E4}">
+                <adec:decorative xmlns:adec="http://schemas.microsoft.com/office/drawing/2017/decorative" val="1"/>
+              </a:ext>
+            </a:extLst>
+          </p:cNvPr>
+          <p:cNvSpPr>
+            <a:spLocks noGrp="1" noRot="1" noChangeAspect="1" noMove="1" noResize="1" noEditPoints="1" noAdjustHandles="1" noChangeArrowheads="1" noChangeShapeType="1" noTextEdit="1"/>
+          </p:cNvSpPr>
+          <p:nvPr>
+            <p:extLst>
+              <p:ext uri="{386F3935-93C4-4BCD-93E2-E3B085C9AB24}">
+                <p16:designElem xmlns:p16="http://schemas.microsoft.com/office/powerpoint/2015/main" val="1"/>
+              </p:ext>
+            </p:extLst>
+          </p:nvPr>
+        </p:nvSpPr>
+        <p:spPr>
+          <a:xfrm>
+            <a:off x="0" y="0"/>
+            <a:ext cx="12188952" cy="6858000"/>
+          </a:xfrm>
+          <a:prstGeom prst="rect">
+            <a:avLst/>
+          </a:prstGeom>
+          <a:ln>
+            <a:noFill/>
+          </a:ln>
+        </p:spPr>
+        <p:style>
+          <a:lnRef idx="2">
+            <a:schemeClr val="accent1">
+              <a:shade val="50000"/>
+            </a:schemeClr>
+          </a:lnRef>
+          <a:fillRef idx="1">
+            <a:schemeClr val="accent1"/>
+          </a:fillRef>
+          <a:effectRef idx="0">
+            <a:schemeClr val="accent1"/>
+          </a:effectRef>
+          <a:fontRef idx="minor">
+            <a:schemeClr val="lt1"/>
+          </a:fontRef>
+        </p:style>
+        <p:txBody>
+          <a:bodyPr rtlCol="0" anchor="ctr"/>
+          <a:lstStyle/>
+          <a:p>
+            <a:pPr algn="ctr"/>
+            <a:endParaRPr lang="en-US"/>
+          </a:p>
+        </p:txBody>
+      </p:sp>
+      <p:sp>
+        <p:nvSpPr>
+          <p:cNvPr id="4" name="Title 1">
+            <a:extLst>
+              <a:ext uri="{FF2B5EF4-FFF2-40B4-BE49-F238E27FC236}">
+                <a16:creationId xmlns:a16="http://schemas.microsoft.com/office/drawing/2014/main" id="{F8FAD16B-1C6E-1FC8-4D27-32E2AC90B369}"/>
+              </a:ext>
+            </a:extLst>
+          </p:cNvPr>
+          <p:cNvSpPr txBox="1">
+            <a:spLocks/>
+          </p:cNvSpPr>
+          <p:nvPr/>
+        </p:nvSpPr>
+        <p:spPr>
+          <a:xfrm>
+            <a:off x="5297762" y="640080"/>
+            <a:ext cx="6251110" cy="3566160"/>
+          </a:xfrm>
+          <a:prstGeom prst="rect">
+            <a:avLst/>
+          </a:prstGeom>
+        </p:spPr>
+        <p:txBody>
+          <a:bodyPr vert="horz" lIns="91440" tIns="45720" rIns="91440" bIns="45720" rtlCol="0" anchor="b">
+            <a:normAutofit/>
+          </a:bodyPr>
+          <a:lstStyle>
+            <a:lvl1pPr algn="l" defTabSz="914400" rtl="0" eaLnBrk="1" latinLnBrk="0" hangingPunct="1">
+              <a:lnSpc>
+                <a:spcPct val="100000"/>
+              </a:lnSpc>
+              <a:spcBef>
+                <a:spcPct val="0"/>
+              </a:spcBef>
+              <a:buNone/>
+              <a:defRPr sz="4800" kern="1200">
+                <a:solidFill>
+                  <a:schemeClr val="tx1"/>
+                </a:solidFill>
+                <a:latin typeface="+mj-lt"/>
+                <a:ea typeface="+mj-ea"/>
+                <a:cs typeface="+mj-cs"/>
+              </a:defRPr>
+            </a:lvl1pPr>
+          </a:lstStyle>
+          <a:p>
+            <a:pPr>
+              <a:spcAft>
+                <a:spcPts val="600"/>
+              </a:spcAft>
+            </a:pPr>
+            <a:r>
+              <a:rPr lang="en-US" sz="9600" b="1" i="1" dirty="0" err="1"/>
+              <a:t>כמה</a:t>
+            </a:r>
+            <a:r>
+              <a:rPr lang="en-US" sz="9600" b="1" i="1" dirty="0"/>
+              <a:t> </a:t>
+            </a:r>
+            <a:r>
+              <a:rPr lang="en-US" sz="9600" b="1" i="1" dirty="0" err="1"/>
+              <a:t>סוסים</a:t>
+            </a:r>
+            <a:r>
+              <a:rPr lang="en-US" sz="9600" b="1" i="1" dirty="0"/>
+              <a:t> </a:t>
+            </a:r>
+            <a:r>
+              <a:rPr lang="en-US" sz="9600" b="1" i="1" dirty="0" err="1"/>
+              <a:t>מופיעים</a:t>
+            </a:r>
+            <a:r>
+              <a:rPr lang="he-IL" sz="9600" b="1" i="1" dirty="0"/>
+              <a:t>?</a:t>
+            </a:r>
+            <a:endParaRPr lang="en-US" sz="9600" b="1" i="1" dirty="0"/>
+          </a:p>
+        </p:txBody>
+      </p:sp>
+      <p:sp>
+        <p:nvSpPr>
+          <p:cNvPr id="15" name="Rectangle 6">
+            <a:extLst>
+              <a:ext uri="{FF2B5EF4-FFF2-40B4-BE49-F238E27FC236}">
+                <a16:creationId xmlns:a16="http://schemas.microsoft.com/office/drawing/2014/main" id="{F49775AF-8896-43EE-92C6-83497D6DC56F}"/>
+              </a:ext>
+              <a:ext uri="{C183D7F6-B498-43B3-948B-1728B52AA6E4}">
+                <adec:decorative xmlns:adec="http://schemas.microsoft.com/office/drawing/2017/decorative" val="1"/>
+              </a:ext>
+            </a:extLst>
+          </p:cNvPr>
+          <p:cNvSpPr>
+            <a:spLocks noGrp="1" noRot="1" noChangeAspect="1" noMove="1" noResize="1" noEditPoints="1" noAdjustHandles="1" noChangeArrowheads="1" noChangeShapeType="1" noTextEdit="1"/>
+          </p:cNvSpPr>
+          <p:nvPr>
+            <p:extLst>
+              <p:ext uri="{386F3935-93C4-4BCD-93E2-E3B085C9AB24}">
+                <p16:designElem xmlns:p16="http://schemas.microsoft.com/office/powerpoint/2015/main" val="1"/>
+              </p:ext>
+            </p:extLst>
+          </p:nvPr>
+        </p:nvSpPr>
+        <p:spPr>
+          <a:xfrm>
+            <a:off x="5412862" y="4409267"/>
+            <a:ext cx="4243589" cy="27432"/>
+          </a:xfrm>
+          <a:custGeom>
+            <a:avLst/>
+            <a:gdLst>
+              <a:gd name="connsiteX0" fmla="*/ 0 w 4243589"/>
+              <a:gd name="connsiteY0" fmla="*/ 0 h 27432"/>
+              <a:gd name="connsiteX1" fmla="*/ 563791 w 4243589"/>
+              <a:gd name="connsiteY1" fmla="*/ 0 h 27432"/>
+              <a:gd name="connsiteX2" fmla="*/ 1042710 w 4243589"/>
+              <a:gd name="connsiteY2" fmla="*/ 0 h 27432"/>
+              <a:gd name="connsiteX3" fmla="*/ 1564066 w 4243589"/>
+              <a:gd name="connsiteY3" fmla="*/ 0 h 27432"/>
+              <a:gd name="connsiteX4" fmla="*/ 2212729 w 4243589"/>
+              <a:gd name="connsiteY4" fmla="*/ 0 h 27432"/>
+              <a:gd name="connsiteX5" fmla="*/ 2776520 w 4243589"/>
+              <a:gd name="connsiteY5" fmla="*/ 0 h 27432"/>
+              <a:gd name="connsiteX6" fmla="*/ 3297875 w 4243589"/>
+              <a:gd name="connsiteY6" fmla="*/ 0 h 27432"/>
+              <a:gd name="connsiteX7" fmla="*/ 4243589 w 4243589"/>
+              <a:gd name="connsiteY7" fmla="*/ 0 h 27432"/>
+              <a:gd name="connsiteX8" fmla="*/ 4243589 w 4243589"/>
+              <a:gd name="connsiteY8" fmla="*/ 27432 h 27432"/>
+              <a:gd name="connsiteX9" fmla="*/ 3637362 w 4243589"/>
+              <a:gd name="connsiteY9" fmla="*/ 27432 h 27432"/>
+              <a:gd name="connsiteX10" fmla="*/ 3116007 w 4243589"/>
+              <a:gd name="connsiteY10" fmla="*/ 27432 h 27432"/>
+              <a:gd name="connsiteX11" fmla="*/ 2424908 w 4243589"/>
+              <a:gd name="connsiteY11" fmla="*/ 27432 h 27432"/>
+              <a:gd name="connsiteX12" fmla="*/ 1861117 w 4243589"/>
+              <a:gd name="connsiteY12" fmla="*/ 27432 h 27432"/>
+              <a:gd name="connsiteX13" fmla="*/ 1382198 w 4243589"/>
+              <a:gd name="connsiteY13" fmla="*/ 27432 h 27432"/>
+              <a:gd name="connsiteX14" fmla="*/ 733535 w 4243589"/>
+              <a:gd name="connsiteY14" fmla="*/ 27432 h 27432"/>
+              <a:gd name="connsiteX15" fmla="*/ 0 w 4243589"/>
+              <a:gd name="connsiteY15" fmla="*/ 27432 h 27432"/>
+              <a:gd name="connsiteX16" fmla="*/ 0 w 4243589"/>
+              <a:gd name="connsiteY16" fmla="*/ 0 h 27432"/>
+            </a:gdLst>
+            <a:ahLst/>
+            <a:cxnLst>
+              <a:cxn ang="0">
+                <a:pos x="connsiteX0" y="connsiteY0"/>
+              </a:cxn>
+              <a:cxn ang="0">
+                <a:pos x="connsiteX1" y="connsiteY1"/>
+              </a:cxn>
+              <a:cxn ang="0">
+                <a:pos x="connsiteX2" y="connsiteY2"/>
+              </a:cxn>
+              <a:cxn ang="0">
+                <a:pos x="connsiteX3" y="connsiteY3"/>
+              </a:cxn>
+              <a:cxn ang="0">
+                <a:pos x="connsiteX4" y="connsiteY4"/>
+              </a:cxn>
+              <a:cxn ang="0">
+                <a:pos x="connsiteX5" y="connsiteY5"/>
+              </a:cxn>
+              <a:cxn ang="0">
+                <a:pos x="connsiteX6" y="connsiteY6"/>
+              </a:cxn>
+              <a:cxn ang="0">
+                <a:pos x="connsiteX7" y="connsiteY7"/>
+              </a:cxn>
+              <a:cxn ang="0">
+                <a:pos x="connsiteX8" y="connsiteY8"/>
+              </a:cxn>
+              <a:cxn ang="0">
+                <a:pos x="connsiteX9" y="connsiteY9"/>
+              </a:cxn>
+              <a:cxn ang="0">
+                <a:pos x="connsiteX10" y="connsiteY10"/>
+              </a:cxn>
+              <a:cxn ang="0">
+                <a:pos x="connsiteX11" y="connsiteY11"/>
+              </a:cxn>
+              <a:cxn ang="0">
+                <a:pos x="connsiteX12" y="connsiteY12"/>
+              </a:cxn>
+              <a:cxn ang="0">
+                <a:pos x="connsiteX13" y="connsiteY13"/>
+              </a:cxn>
+              <a:cxn ang="0">
+                <a:pos x="connsiteX14" y="connsiteY14"/>
+              </a:cxn>
+              <a:cxn ang="0">
+                <a:pos x="connsiteX15" y="connsiteY15"/>
+              </a:cxn>
+              <a:cxn ang="0">
+                <a:pos x="connsiteX16" y="connsiteY16"/>
+              </a:cxn>
+            </a:cxnLst>
+            <a:rect l="l" t="t" r="r" b="b"/>
+            <a:pathLst>
+              <a:path w="4243589" h="27432" fill="none" extrusionOk="0">
+                <a:moveTo>
+                  <a:pt x="0" y="0"/>
+                </a:moveTo>
+                <a:cubicBezTo>
+                  <a:pt x="157351" y="-15653"/>
+                  <a:pt x="378877" y="-5828"/>
+                  <a:pt x="563791" y="0"/>
+                </a:cubicBezTo>
+                <a:cubicBezTo>
+                  <a:pt x="748705" y="5828"/>
+                  <a:pt x="905659" y="-5525"/>
+                  <a:pt x="1042710" y="0"/>
+                </a:cubicBezTo>
+                <a:cubicBezTo>
+                  <a:pt x="1179761" y="5525"/>
+                  <a:pt x="1356845" y="-21288"/>
+                  <a:pt x="1564066" y="0"/>
+                </a:cubicBezTo>
+                <a:cubicBezTo>
+                  <a:pt x="1771287" y="21288"/>
+                  <a:pt x="1912099" y="25135"/>
+                  <a:pt x="2212729" y="0"/>
+                </a:cubicBezTo>
+                <a:cubicBezTo>
+                  <a:pt x="2513359" y="-25135"/>
+                  <a:pt x="2514918" y="-27119"/>
+                  <a:pt x="2776520" y="0"/>
+                </a:cubicBezTo>
+                <a:cubicBezTo>
+                  <a:pt x="3038122" y="27119"/>
+                  <a:pt x="3178771" y="18116"/>
+                  <a:pt x="3297875" y="0"/>
+                </a:cubicBezTo>
+                <a:cubicBezTo>
+                  <a:pt x="3416980" y="-18116"/>
+                  <a:pt x="4012240" y="-40869"/>
+                  <a:pt x="4243589" y="0"/>
+                </a:cubicBezTo>
+                <a:cubicBezTo>
+                  <a:pt x="4242616" y="8304"/>
+                  <a:pt x="4243111" y="21512"/>
+                  <a:pt x="4243589" y="27432"/>
+                </a:cubicBezTo>
+                <a:cubicBezTo>
+                  <a:pt x="4112949" y="6289"/>
+                  <a:pt x="3928037" y="10975"/>
+                  <a:pt x="3637362" y="27432"/>
+                </a:cubicBezTo>
+                <a:cubicBezTo>
+                  <a:pt x="3346687" y="43889"/>
+                  <a:pt x="3254446" y="35813"/>
+                  <a:pt x="3116007" y="27432"/>
+                </a:cubicBezTo>
+                <a:cubicBezTo>
+                  <a:pt x="2977569" y="19051"/>
+                  <a:pt x="2620228" y="38017"/>
+                  <a:pt x="2424908" y="27432"/>
+                </a:cubicBezTo>
+                <a:cubicBezTo>
+                  <a:pt x="2229588" y="16847"/>
+                  <a:pt x="2088287" y="5290"/>
+                  <a:pt x="1861117" y="27432"/>
+                </a:cubicBezTo>
+                <a:cubicBezTo>
+                  <a:pt x="1633947" y="49574"/>
+                  <a:pt x="1502447" y="8273"/>
+                  <a:pt x="1382198" y="27432"/>
+                </a:cubicBezTo>
+                <a:cubicBezTo>
+                  <a:pt x="1261949" y="46591"/>
+                  <a:pt x="1045440" y="37497"/>
+                  <a:pt x="733535" y="27432"/>
+                </a:cubicBezTo>
+                <a:cubicBezTo>
+                  <a:pt x="421630" y="17367"/>
+                  <a:pt x="341257" y="-9215"/>
+                  <a:pt x="0" y="27432"/>
+                </a:cubicBezTo>
+                <a:cubicBezTo>
+                  <a:pt x="-1048" y="14992"/>
+                  <a:pt x="-1120" y="7447"/>
+                  <a:pt x="0" y="0"/>
+                </a:cubicBezTo>
+                <a:close/>
+              </a:path>
+              <a:path w="4243589" h="27432" stroke="0" extrusionOk="0">
+                <a:moveTo>
+                  <a:pt x="0" y="0"/>
+                </a:moveTo>
+                <a:cubicBezTo>
+                  <a:pt x="128164" y="17204"/>
+                  <a:pt x="312653" y="1129"/>
+                  <a:pt x="563791" y="0"/>
+                </a:cubicBezTo>
+                <a:cubicBezTo>
+                  <a:pt x="814929" y="-1129"/>
+                  <a:pt x="837271" y="8503"/>
+                  <a:pt x="1042710" y="0"/>
+                </a:cubicBezTo>
+                <a:cubicBezTo>
+                  <a:pt x="1248149" y="-8503"/>
+                  <a:pt x="1588432" y="-28862"/>
+                  <a:pt x="1733809" y="0"/>
+                </a:cubicBezTo>
+                <a:cubicBezTo>
+                  <a:pt x="1879186" y="28862"/>
+                  <a:pt x="2052815" y="5974"/>
+                  <a:pt x="2297600" y="0"/>
+                </a:cubicBezTo>
+                <a:cubicBezTo>
+                  <a:pt x="2542385" y="-5974"/>
+                  <a:pt x="2699960" y="-23550"/>
+                  <a:pt x="2861391" y="0"/>
+                </a:cubicBezTo>
+                <a:cubicBezTo>
+                  <a:pt x="3022822" y="23550"/>
+                  <a:pt x="3390411" y="25272"/>
+                  <a:pt x="3552490" y="0"/>
+                </a:cubicBezTo>
+                <a:cubicBezTo>
+                  <a:pt x="3714569" y="-25272"/>
+                  <a:pt x="3950585" y="-31327"/>
+                  <a:pt x="4243589" y="0"/>
+                </a:cubicBezTo>
+                <a:cubicBezTo>
+                  <a:pt x="4244074" y="9333"/>
+                  <a:pt x="4244867" y="19699"/>
+                  <a:pt x="4243589" y="27432"/>
+                </a:cubicBezTo>
+                <a:cubicBezTo>
+                  <a:pt x="4130424" y="7904"/>
+                  <a:pt x="3932803" y="51393"/>
+                  <a:pt x="3722234" y="27432"/>
+                </a:cubicBezTo>
+                <a:cubicBezTo>
+                  <a:pt x="3511665" y="3471"/>
+                  <a:pt x="3269903" y="55138"/>
+                  <a:pt x="3116007" y="27432"/>
+                </a:cubicBezTo>
+                <a:cubicBezTo>
+                  <a:pt x="2962111" y="-274"/>
+                  <a:pt x="2744280" y="32368"/>
+                  <a:pt x="2509780" y="27432"/>
+                </a:cubicBezTo>
+                <a:cubicBezTo>
+                  <a:pt x="2275280" y="22496"/>
+                  <a:pt x="2066059" y="52808"/>
+                  <a:pt x="1945989" y="27432"/>
+                </a:cubicBezTo>
+                <a:cubicBezTo>
+                  <a:pt x="1825919" y="2056"/>
+                  <a:pt x="1407329" y="21760"/>
+                  <a:pt x="1254890" y="27432"/>
+                </a:cubicBezTo>
+                <a:cubicBezTo>
+                  <a:pt x="1102451" y="33104"/>
+                  <a:pt x="837950" y="40817"/>
+                  <a:pt x="563791" y="27432"/>
+                </a:cubicBezTo>
+                <a:cubicBezTo>
+                  <a:pt x="289632" y="14047"/>
+                  <a:pt x="132768" y="16249"/>
+                  <a:pt x="0" y="27432"/>
+                </a:cubicBezTo>
+                <a:cubicBezTo>
+                  <a:pt x="211" y="18145"/>
+                  <a:pt x="120" y="6480"/>
+                  <a:pt x="0" y="0"/>
+                </a:cubicBezTo>
+                <a:close/>
+              </a:path>
+            </a:pathLst>
+          </a:custGeom>
+          <a:solidFill>
+            <a:srgbClr val="C69796"/>
+          </a:solidFill>
+          <a:ln w="38100" cap="rnd">
+            <a:solidFill>
+              <a:srgbClr val="C69796"/>
+            </a:solidFill>
+            <a:round/>
+            <a:extLst>
+              <a:ext uri="{C807C97D-BFC1-408E-A445-0C87EB9F89A2}">
+                <ask:lineSketchStyleProps xmlns:ask="http://schemas.microsoft.com/office/drawing/2018/sketchyshapes" sd="1219033472">
+                  <a:prstGeom prst="rect">
+                    <a:avLst/>
+                  </a:prstGeom>
+                  <ask:type>
+                    <ask:lineSketchFreehand/>
+                  </ask:type>
+                </ask:lineSketchStyleProps>
+              </a:ext>
+            </a:extLst>
+          </a:ln>
+        </p:spPr>
+        <p:style>
+          <a:lnRef idx="2">
+            <a:schemeClr val="accent1">
+              <a:shade val="50000"/>
+            </a:schemeClr>
+          </a:lnRef>
+          <a:fillRef idx="1">
+            <a:schemeClr val="accent1"/>
+          </a:fillRef>
+          <a:effectRef idx="0">
+            <a:schemeClr val="accent1"/>
+          </a:effectRef>
+          <a:fontRef idx="minor">
+            <a:schemeClr val="lt1"/>
+          </a:fontRef>
+        </p:style>
+        <p:txBody>
+          <a:bodyPr rtlCol="0" anchor="ctr"/>
+          <a:lstStyle/>
+          <a:p>
+            <a:pPr algn="ctr"/>
+            <a:endParaRPr lang="en-US"/>
+          </a:p>
+        </p:txBody>
+      </p:sp>
+      <p:pic>
+        <p:nvPicPr>
+          <p:cNvPr id="6" name="Picture 5" descr="סוסים באסם">
+            <a:extLst>
+              <a:ext uri="{FF2B5EF4-FFF2-40B4-BE49-F238E27FC236}">
+                <a16:creationId xmlns:a16="http://schemas.microsoft.com/office/drawing/2014/main" id="{185BD5F3-921A-853D-C4AD-3770E567926B}"/>
+              </a:ext>
+            </a:extLst>
+          </p:cNvPr>
+          <p:cNvPicPr>
+            <a:picLocks noChangeAspect="1"/>
+          </p:cNvPicPr>
+          <p:nvPr/>
+        </p:nvPicPr>
+        <p:blipFill rotWithShape="1">
+          <a:blip r:embed="rId3"/>
+          <a:srcRect l="25582" r="29086" b="-1"/>
+          <a:stretch/>
+        </p:blipFill>
+        <p:spPr>
+          <a:xfrm>
+            <a:off x="1" y="10"/>
+            <a:ext cx="4657344" cy="6857990"/>
+          </a:xfrm>
+          <a:custGeom>
+            <a:avLst/>
+            <a:gdLst/>
+            <a:ahLst/>
+            <a:cxnLst/>
+            <a:rect l="l" t="t" r="r" b="b"/>
+            <a:pathLst>
+              <a:path w="4657344" h="6858000">
+                <a:moveTo>
+                  <a:pt x="0" y="0"/>
+                </a:moveTo>
+                <a:lnTo>
+                  <a:pt x="3429755" y="0"/>
+                </a:lnTo>
+                <a:lnTo>
+                  <a:pt x="3526016" y="148742"/>
+                </a:lnTo>
+                <a:cubicBezTo>
+                  <a:pt x="3657740" y="365513"/>
+                  <a:pt x="3777402" y="589569"/>
+                  <a:pt x="3886489" y="819975"/>
+                </a:cubicBezTo>
+                <a:cubicBezTo>
+                  <a:pt x="3891856" y="833492"/>
+                  <a:pt x="3900663" y="845393"/>
+                  <a:pt x="3912049" y="854514"/>
+                </a:cubicBezTo>
+                <a:cubicBezTo>
+                  <a:pt x="3897352" y="819849"/>
+                  <a:pt x="3883037" y="784928"/>
+                  <a:pt x="3868083" y="750263"/>
+                </a:cubicBezTo>
+                <a:cubicBezTo>
+                  <a:pt x="3806989" y="608712"/>
+                  <a:pt x="3742478" y="469145"/>
+                  <a:pt x="3674155" y="331786"/>
+                </a:cubicBezTo>
+                <a:lnTo>
+                  <a:pt x="3496656" y="0"/>
+                </a:lnTo>
+                <a:lnTo>
+                  <a:pt x="3554371" y="0"/>
+                </a:lnTo>
+                <a:lnTo>
+                  <a:pt x="3661621" y="196614"/>
+                </a:lnTo>
+                <a:cubicBezTo>
+                  <a:pt x="3856899" y="573253"/>
+                  <a:pt x="4021071" y="966066"/>
+                  <a:pt x="4161279" y="1371196"/>
+                </a:cubicBezTo>
+                <a:cubicBezTo>
+                  <a:pt x="4379525" y="2007265"/>
+                  <a:pt x="4530141" y="2664286"/>
+                  <a:pt x="4610660" y="3331516"/>
+                </a:cubicBezTo>
+                <a:cubicBezTo>
+                  <a:pt x="4652837" y="3672965"/>
+                  <a:pt x="4671625" y="4013908"/>
+                  <a:pt x="4645040" y="4357388"/>
+                </a:cubicBezTo>
+                <a:cubicBezTo>
+                  <a:pt x="4613599" y="4758899"/>
+                  <a:pt x="4566181" y="5157998"/>
+                  <a:pt x="4485789" y="5552906"/>
+                </a:cubicBezTo>
+                <a:cubicBezTo>
+                  <a:pt x="4397121" y="5988893"/>
+                  <a:pt x="4276748" y="6414594"/>
+                  <a:pt x="4117769" y="6828295"/>
+                </a:cubicBezTo>
+                <a:lnTo>
+                  <a:pt x="4105288" y="6858000"/>
+                </a:lnTo>
+                <a:lnTo>
+                  <a:pt x="4052520" y="6858000"/>
+                </a:lnTo>
+                <a:lnTo>
+                  <a:pt x="4059369" y="6841549"/>
+                </a:lnTo>
+                <a:cubicBezTo>
+                  <a:pt x="4147276" y="6614016"/>
+                  <a:pt x="4224193" y="6380817"/>
+                  <a:pt x="4291518" y="6142729"/>
+                </a:cubicBezTo>
+                <a:cubicBezTo>
+                  <a:pt x="4350055" y="5935370"/>
+                  <a:pt x="4393256" y="5723695"/>
+                  <a:pt x="4443357" y="5513923"/>
+                </a:cubicBezTo>
+                <a:cubicBezTo>
+                  <a:pt x="4444541" y="5502788"/>
+                  <a:pt x="4445137" y="5491601"/>
+                  <a:pt x="4445146" y="5480401"/>
+                </a:cubicBezTo>
+                <a:cubicBezTo>
+                  <a:pt x="4408465" y="5607635"/>
+                  <a:pt x="4379196" y="5719759"/>
+                  <a:pt x="4344559" y="5830359"/>
+                </a:cubicBezTo>
+                <a:cubicBezTo>
+                  <a:pt x="4254261" y="6118381"/>
+                  <a:pt x="4150112" y="6398531"/>
+                  <a:pt x="4031702" y="6670527"/>
+                </a:cubicBezTo>
+                <a:lnTo>
+                  <a:pt x="3943824" y="6858000"/>
+                </a:lnTo>
+                <a:lnTo>
+                  <a:pt x="0" y="6858000"/>
+                </a:lnTo>
+                <a:close/>
+              </a:path>
+            </a:pathLst>
+          </a:custGeom>
+        </p:spPr>
+      </p:pic>
+    </p:spTree>
+    <p:extLst>
+      <p:ext uri="{BB962C8B-B14F-4D97-AF65-F5344CB8AC3E}">
+        <p14:creationId xmlns:p14="http://schemas.microsoft.com/office/powerpoint/2010/main" val="2587250413"/>
+      </p:ext>
+    </p:extLst>
+  </p:cSld>
+  <p:clrMapOvr>
+    <a:masterClrMapping/>
+  </p:clrMapOvr>
+  <p:timing>
+    <p:tnLst>
+      <p:par>
+        <p:cTn id="1" dur="indefinite" restart="never" nodeType="tmRoot">
+          <p:childTnLst>
+            <p:seq concurrent="1" nextAc="seek">
+              <p:cTn id="2" dur="indefinite" nodeType="mainSeq">
+                <p:childTnLst>
+                  <p:par>
+                    <p:cTn id="3" fill="hold">
+                      <p:stCondLst>
+                        <p:cond delay="indefinite"/>
+                        <p:cond evt="onBegin" delay="0">
+                          <p:tn val="2"/>
+                        </p:cond>
+                      </p:stCondLst>
+                      <p:childTnLst>
+                        <p:par>
+                          <p:cTn id="4" fill="hold">
+                            <p:stCondLst>
+                              <p:cond delay="0"/>
+                            </p:stCondLst>
+                            <p:childTnLst>
+                              <p:par>
+                                <p:cTn id="5" presetID="10" presetClass="entr" presetSubtype="0" fill="hold" grpId="0" nodeType="withEffect">
+                                  <p:stCondLst>
+                                    <p:cond delay="1000"/>
+                                  </p:stCondLst>
+                                  <p:iterate type="lt">
+                                    <p:tmPct val="10000"/>
+                                  </p:iterate>
+                                  <p:childTnLst>
+                                    <p:set>
+                                      <p:cBhvr>
+                                        <p:cTn id="6" dur="1" fill="hold">
+                                          <p:stCondLst>
+                                            <p:cond delay="0"/>
+                                          </p:stCondLst>
+                                        </p:cTn>
+                                        <p:tgtEl>
+                                          <p:spTgt spid="4"/>
+                                        </p:tgtEl>
+                                        <p:attrNameLst>
+                                          <p:attrName>style.visibility</p:attrName>
+                                        </p:attrNameLst>
+                                      </p:cBhvr>
+                                      <p:to>
+                                        <p:strVal val="visible"/>
+                                      </p:to>
+                                    </p:set>
+                                    <p:animEffect transition="in" filter="fade">
+                                      <p:cBhvr>
+                                        <p:cTn id="7" dur="400"/>
+                                        <p:tgtEl>
+                                          <p:spTgt spid="4"/>
+                                        </p:tgtEl>
+                                      </p:cBhvr>
+                                    </p:animEffect>
+                                  </p:childTnLst>
+                                </p:cTn>
+                              </p:par>
+                            </p:childTnLst>
+                          </p:cTn>
+                        </p:par>
+                      </p:childTnLst>
+                    </p:cTn>
+                  </p:par>
+                </p:childTnLst>
+              </p:cTn>
+              <p:prevCondLst>
+                <p:cond evt="onPrev" delay="0">
+                  <p:tgtEl>
+                    <p:sldTgt/>
+                  </p:tgtEl>
+                </p:cond>
+              </p:prevCondLst>
+              <p:nextCondLst>
+                <p:cond evt="onNext" delay="0">
+                  <p:tgtEl>
+                    <p:sldTgt/>
+                  </p:tgtEl>
+                </p:cond>
+              </p:nextCondLst>
+            </p:seq>
+          </p:childTnLst>
+        </p:cTn>
+      </p:par>
+    </p:tnLst>
+    <p:bldLst>
+      <p:bldP spid="4" grpId="0"/>
+    </p:bldLst>
+  </p:timing>
+</p:sld>
+</file>
+
+<file path=ppt/slides/slide3.xml><?xml version="1.0" encoding="utf-8"?>
+<p:sld xmlns:a="http://schemas.openxmlformats.org/drawingml/2006/main" xmlns:r="http://schemas.openxmlformats.org/officeDocument/2006/relationships" xmlns:p="http://schemas.openxmlformats.org/presentationml/2006/main">
+  <p:cSld>
+    <p:bg>
+      <p:bgPr>
+        <a:solidFill>
+          <a:schemeClr val="bg1"/>
+        </a:solidFill>
+        <a:effectLst/>
+      </p:bgPr>
+    </p:bg>
+    <p:spTree>
+      <p:nvGrpSpPr>
+        <p:cNvPr id="1" name=""/>
+        <p:cNvGrpSpPr/>
+        <p:nvPr/>
+      </p:nvGrpSpPr>
+      <p:grpSpPr>
+        <a:xfrm>
+          <a:off x="0" y="0"/>
+          <a:ext cx="0" cy="0"/>
+          <a:chOff x="0" y="0"/>
+          <a:chExt cx="0" cy="0"/>
+        </a:xfrm>
+      </p:grpSpPr>
       <p:sp useBgFill="1">
         <p:nvSpPr>
           <p:cNvPr id="8" name="Rectangle 7">
@@ -8366,7 +9671,7 @@
 </p:sld>
 </file>
 
-<file path=ppt/slides/slide3.xml><?xml version="1.0" encoding="utf-8"?>
+<file path=ppt/slides/slide4.xml><?xml version="1.0" encoding="utf-8"?>
 <p:sld xmlns:a="http://schemas.openxmlformats.org/drawingml/2006/main" xmlns:r="http://schemas.openxmlformats.org/officeDocument/2006/relationships" xmlns:p="http://schemas.openxmlformats.org/presentationml/2006/main">
   <p:cSld>
     <p:bg>
@@ -9077,7 +10382,7 @@
 </p:sld>
 </file>
 
-<file path=ppt/slides/slide4.xml><?xml version="1.0" encoding="utf-8"?>
+<file path=ppt/slides/slide5.xml><?xml version="1.0" encoding="utf-8"?>
 <p:sld xmlns:a="http://schemas.openxmlformats.org/drawingml/2006/main" xmlns:r="http://schemas.openxmlformats.org/officeDocument/2006/relationships" xmlns:p="http://schemas.openxmlformats.org/presentationml/2006/main">
   <p:cSld>
     <p:bg>
@@ -9987,4 +11292,47 @@
     </a:ext>
   </a:extLst>
 </a:theme>
+</file>
+
+<file path=ppt/theme/themeOverride1.xml><?xml version="1.0" encoding="utf-8"?>
+<a:themeOverride xmlns:a="http://schemas.openxmlformats.org/drawingml/2006/main">
+  <a:clrScheme name="AnalogousFromLightSeedRightStep">
+    <a:dk1>
+      <a:srgbClr val="000000"/>
+    </a:dk1>
+    <a:lt1>
+      <a:srgbClr val="FFFFFF"/>
+    </a:lt1>
+    <a:dk2>
+      <a:srgbClr val="402441"/>
+    </a:dk2>
+    <a:lt2>
+      <a:srgbClr val="E2E8E8"/>
+    </a:lt2>
+    <a:accent1>
+      <a:srgbClr val="C69796"/>
+    </a:accent1>
+    <a:accent2>
+      <a:srgbClr val="BA997F"/>
+    </a:accent2>
+    <a:accent3>
+      <a:srgbClr val="AAA481"/>
+    </a:accent3>
+    <a:accent4>
+      <a:srgbClr val="9BAA74"/>
+    </a:accent4>
+    <a:accent5>
+      <a:srgbClr val="8FAC82"/>
+    </a:accent5>
+    <a:accent6>
+      <a:srgbClr val="78B07E"/>
+    </a:accent6>
+    <a:hlink>
+      <a:srgbClr val="568D8E"/>
+    </a:hlink>
+    <a:folHlink>
+      <a:srgbClr val="7F7F7F"/>
+    </a:folHlink>
+  </a:clrScheme>
+</a:themeOverride>
 </file>
</xml_diff>